<commit_message>
[mod] gatekeeper 가이드 audience mapper 설정 추가
</commit_message>
<xml_diff>
--- a/guide/keycloak-gatekeeper/keycloak-gatekeeper.pptx
+++ b/guide/keycloak-gatekeeper/keycloak-gatekeeper.pptx
@@ -5,10 +5,10 @@
     <p:sldMasterId id="2147483648" r:id="rId1"/>
   </p:sldMasterIdLst>
   <p:notesMasterIdLst>
-    <p:notesMasterId r:id="rId10"/>
+    <p:notesMasterId r:id="rId11"/>
   </p:notesMasterIdLst>
   <p:handoutMasterIdLst>
-    <p:handoutMasterId r:id="rId11"/>
+    <p:handoutMasterId r:id="rId12"/>
   </p:handoutMasterIdLst>
   <p:sldIdLst>
     <p:sldId id="256" r:id="rId3"/>
@@ -16,8 +16,9 @@
     <p:sldId id="463" r:id="rId5"/>
     <p:sldId id="464" r:id="rId6"/>
     <p:sldId id="465" r:id="rId7"/>
-    <p:sldId id="443" r:id="rId8"/>
-    <p:sldId id="466" r:id="rId9"/>
+    <p:sldId id="468" r:id="rId8"/>
+    <p:sldId id="443" r:id="rId9"/>
+    <p:sldId id="466" r:id="rId10"/>
   </p:sldIdLst>
   <p:sldSz cx="9144000" cy="6858000" type="screen4x3"/>
   <p:notesSz cx="9926320" cy="6797675"/>
@@ -5490,6 +5491,269 @@
           <a:p>
             <a:r>
               <a:rPr lang="en-US" altLang="ko-KR" b="1" dirty="0"/>
+              <a:t>Hyperauth </a:t>
+            </a:r>
+            <a:r>
+              <a:rPr lang="ko-KR" altLang="en-US" b="1" dirty="0"/>
+              <a:t>설정</a:t>
+            </a:r>
+            <a:r>
+              <a:rPr lang="en-US" altLang="ko-KR" b="1" dirty="0"/>
+              <a:t> 4</a:t>
+            </a:r>
+            <a:endParaRPr lang="en-US" altLang="ko-KR" b="1" dirty="0"/>
+          </a:p>
+        </p:txBody>
+      </p:sp>
+      <p:sp>
+        <p:nvSpPr>
+          <p:cNvPr id="4" name="슬라이드 번호 개체 틀 3"/>
+          <p:cNvSpPr>
+            <a:spLocks noGrp="1"/>
+          </p:cNvSpPr>
+          <p:nvPr>
+            <p:ph type="sldNum" sz="quarter" idx="12"/>
+          </p:nvPr>
+        </p:nvSpPr>
+        <p:spPr/>
+        <p:txBody>
+          <a:bodyPr/>
+          <a:lstStyle/>
+          <a:p>
+            <a:fld id="{46AE23CF-7DA0-4EBA-8411-E6590A2914FC}" type="slidenum">
+              <a:rPr lang="ko-KR" altLang="en-US" smtClean="0"/>
+            </a:fld>
+            <a:r>
+              <a:rPr lang="ko-KR" altLang="en-US" dirty="0"/>
+              <a:t> </a:t>
+            </a:r>
+            <a:r>
+              <a:rPr lang="en-US" altLang="ko-KR" dirty="0"/>
+              <a:t>/ 24</a:t>
+            </a:r>
+            <a:endParaRPr lang="ko-KR" altLang="en-US" dirty="0"/>
+          </a:p>
+        </p:txBody>
+      </p:sp>
+      <p:sp>
+        <p:nvSpPr>
+          <p:cNvPr id="29" name="직사각형 4"/>
+          <p:cNvSpPr/>
+          <p:nvPr/>
+        </p:nvSpPr>
+        <p:spPr>
+          <a:xfrm>
+            <a:off x="182245" y="843280"/>
+            <a:ext cx="9101455" cy="5613400"/>
+          </a:xfrm>
+          <a:prstGeom prst="rect">
+            <a:avLst/>
+          </a:prstGeom>
+        </p:spPr>
+        <p:txBody>
+          <a:bodyPr wrap="square">
+            <a:noAutofit/>
+          </a:bodyPr>
+          <a:lstStyle/>
+          <a:p>
+            <a:r>
+              <a:rPr lang="en-US" sz="1600" dirty="0">
+                <a:latin typeface="+mn-ea"/>
+              </a:rPr>
+              <a:t>- client / gatekeeper / Mappers / Create </a:t>
+            </a:r>
+            <a:r>
+              <a:rPr lang="ko-KR" altLang="en-US" sz="1600" dirty="0">
+                <a:latin typeface="+mn-ea"/>
+              </a:rPr>
+              <a:t>생성</a:t>
+            </a:r>
+            <a:endParaRPr lang="ko-KR" altLang="en-US" sz="1600" dirty="0">
+              <a:latin typeface="+mn-ea"/>
+            </a:endParaRPr>
+          </a:p>
+          <a:p>
+            <a:r>
+              <a:rPr lang="ko-KR" altLang="en-US" sz="1600" dirty="0">
+                <a:latin typeface="+mn-ea"/>
+              </a:rPr>
+              <a:t> </a:t>
+            </a:r>
+            <a:r>
+              <a:rPr lang="en-US" altLang="ko-KR" sz="1600" dirty="0">
+                <a:latin typeface="+mn-ea"/>
+              </a:rPr>
+              <a:t> - Access Token Audience</a:t>
+            </a:r>
+            <a:r>
+              <a:rPr lang="ko-KR" altLang="en-US" sz="1600" dirty="0">
+                <a:latin typeface="+mn-ea"/>
+              </a:rPr>
+              <a:t>에</a:t>
+            </a:r>
+            <a:r>
+              <a:rPr lang="en-US" altLang="ko-KR" sz="1600" dirty="0">
+                <a:latin typeface="+mn-ea"/>
+              </a:rPr>
+              <a:t> gatekeeper</a:t>
+            </a:r>
+            <a:r>
+              <a:rPr lang="ko-KR" altLang="en-US" sz="1600" dirty="0">
+                <a:latin typeface="+mn-ea"/>
+              </a:rPr>
+              <a:t>를</a:t>
+            </a:r>
+            <a:r>
+              <a:rPr lang="en-US" altLang="ko-KR" sz="1600" dirty="0">
+                <a:latin typeface="+mn-ea"/>
+              </a:rPr>
+              <a:t> </a:t>
+            </a:r>
+            <a:r>
+              <a:rPr lang="ko-KR" altLang="en-US" sz="1600" dirty="0">
+                <a:latin typeface="+mn-ea"/>
+              </a:rPr>
+              <a:t>포함시키기</a:t>
+            </a:r>
+            <a:r>
+              <a:rPr lang="en-US" altLang="ko-KR" sz="1600" dirty="0">
+                <a:latin typeface="+mn-ea"/>
+              </a:rPr>
+              <a:t> </a:t>
+            </a:r>
+            <a:r>
+              <a:rPr lang="ko-KR" altLang="en-US" sz="1600" dirty="0">
+                <a:latin typeface="+mn-ea"/>
+              </a:rPr>
+              <a:t>위함</a:t>
+            </a:r>
+            <a:endParaRPr lang="en-US" altLang="ko-KR" sz="1600" dirty="0">
+              <a:latin typeface="+mn-ea"/>
+            </a:endParaRPr>
+          </a:p>
+          <a:p>
+            <a:r>
+              <a:rPr lang="en-US" sz="1600" dirty="0">
+                <a:latin typeface="+mn-ea"/>
+              </a:rPr>
+              <a:t> </a:t>
+            </a:r>
+            <a:endParaRPr lang="ko-KR" altLang="en-US" sz="1600" dirty="0">
+              <a:latin typeface="+mn-ea"/>
+            </a:endParaRPr>
+          </a:p>
+          <a:p>
+            <a:endParaRPr lang="en-US" altLang="ko-KR" sz="1600" dirty="0">
+              <a:latin typeface="+mn-ea"/>
+            </a:endParaRPr>
+          </a:p>
+          <a:p>
+            <a:endParaRPr lang="en-US" altLang="ko-KR" sz="1600" dirty="0">
+              <a:latin typeface="+mn-ea"/>
+            </a:endParaRPr>
+          </a:p>
+          <a:p>
+            <a:endParaRPr lang="en-US" altLang="ko-KR" sz="1600" dirty="0">
+              <a:latin typeface="+mn-ea"/>
+            </a:endParaRPr>
+          </a:p>
+          <a:p>
+            <a:r>
+              <a:rPr lang="en-US" altLang="ko-KR" sz="1600" dirty="0">
+                <a:latin typeface="+mn-ea"/>
+              </a:rPr>
+              <a:t>  </a:t>
+            </a:r>
+            <a:endParaRPr lang="en-US" altLang="ko-KR" sz="1600" dirty="0">
+              <a:latin typeface="+mn-ea"/>
+            </a:endParaRPr>
+          </a:p>
+          <a:p>
+            <a:endParaRPr lang="en-US" altLang="ko-KR" sz="1600" dirty="0">
+              <a:latin typeface="+mn-ea"/>
+            </a:endParaRPr>
+          </a:p>
+          <a:p>
+            <a:r>
+              <a:rPr lang="en-US" sz="1600" dirty="0">
+                <a:latin typeface="+mn-ea"/>
+              </a:rPr>
+              <a:t> </a:t>
+            </a:r>
+            <a:endParaRPr lang="ko-KR" altLang="en-US" sz="1600" dirty="0">
+              <a:latin typeface="+mn-ea"/>
+            </a:endParaRPr>
+          </a:p>
+        </p:txBody>
+      </p:sp>
+      <p:pic>
+        <p:nvPicPr>
+          <p:cNvPr id="6" name="Content Placeholder 5"/>
+          <p:cNvPicPr>
+            <a:picLocks noChangeAspect="1"/>
+          </p:cNvPicPr>
+          <p:nvPr>
+            <p:ph idx="1"/>
+          </p:nvPr>
+        </p:nvPicPr>
+        <p:blipFill>
+          <a:blip r:embed="rId1"/>
+          <a:stretch>
+            <a:fillRect/>
+          </a:stretch>
+        </p:blipFill>
+        <p:spPr>
+          <a:xfrm>
+            <a:off x="182245" y="1466215"/>
+            <a:ext cx="8606790" cy="3425825"/>
+          </a:xfrm>
+          <a:prstGeom prst="rect">
+            <a:avLst/>
+          </a:prstGeom>
+        </p:spPr>
+      </p:pic>
+    </p:spTree>
+  </p:cSld>
+  <p:clrMapOvr>
+    <a:masterClrMapping/>
+  </p:clrMapOvr>
+</p:sld>
+</file>
+
+<file path=ppt/slides/slide7.xml><?xml version="1.0" encoding="utf-8"?>
+<p:sld xmlns:a="http://schemas.openxmlformats.org/drawingml/2006/main" xmlns:r="http://schemas.openxmlformats.org/officeDocument/2006/relationships" xmlns:p="http://schemas.openxmlformats.org/presentationml/2006/main">
+  <p:cSld>
+    <p:spTree>
+      <p:nvGrpSpPr>
+        <p:cNvPr id="1" name=""/>
+        <p:cNvGrpSpPr/>
+        <p:nvPr/>
+      </p:nvGrpSpPr>
+      <p:grpSpPr>
+        <a:xfrm>
+          <a:off x="0" y="0"/>
+          <a:ext cx="0" cy="0"/>
+          <a:chOff x="0" y="0"/>
+          <a:chExt cx="0" cy="0"/>
+        </a:xfrm>
+      </p:grpSpPr>
+      <p:sp>
+        <p:nvSpPr>
+          <p:cNvPr id="2" name="제목 1"/>
+          <p:cNvSpPr>
+            <a:spLocks noGrp="1"/>
+          </p:cNvSpPr>
+          <p:nvPr>
+            <p:ph type="title"/>
+          </p:nvPr>
+        </p:nvSpPr>
+        <p:spPr/>
+        <p:txBody>
+          <a:bodyPr/>
+          <a:lstStyle/>
+          <a:p>
+            <a:r>
+              <a:rPr lang="en-US" altLang="ko-KR" b="1" dirty="0"/>
               <a:t>Keycloak Gatekeeper Deploy 1</a:t>
             </a:r>
             <a:endParaRPr lang="en-US" altLang="ko-KR" b="1" dirty="0"/>
@@ -7973,7 +8237,7 @@
 </p:sld>
 </file>
 
-<file path=ppt/slides/slide7.xml><?xml version="1.0" encoding="utf-8"?>
+<file path=ppt/slides/slide8.xml><?xml version="1.0" encoding="utf-8"?>
 <p:sld xmlns:a="http://schemas.openxmlformats.org/drawingml/2006/main" xmlns:r="http://schemas.openxmlformats.org/officeDocument/2006/relationships" xmlns:p="http://schemas.openxmlformats.org/presentationml/2006/main">
   <p:cSld>
     <p:spTree>

</xml_diff>